<commit_message>
spell check in presentation
</commit_message>
<xml_diff>
--- a/TKT Project Whitepaper.pptx
+++ b/TKT Project Whitepaper.pptx
@@ -956,7 +956,7 @@
         </p:nvSpPr>
         <p:spPr>
           <a:xfrm>
-            <a:off x="381300" y="685800"/>
+            <a:off x="381000" y="685800"/>
             <a:ext cx="6096000" cy="3429000"/>
           </a:xfrm>
           <a:custGeom>
@@ -8726,10 +8726,10 @@
               <a:buNone/>
             </a:pPr>
             <a:r>
-              <a:rPr lang="en-CA"/>
+              <a:rPr lang="en-CA" dirty="0"/>
               <a:t>TKT is a ticket sale and management application built with ERC721 NFTs on the Ethereum Network.</a:t>
             </a:r>
-            <a:endParaRPr/>
+            <a:endParaRPr dirty="0"/>
           </a:p>
           <a:p>
             <a:pPr marL="0" lvl="0" indent="0" algn="l" rtl="0">
@@ -8742,10 +8742,10 @@
               <a:buNone/>
             </a:pPr>
             <a:r>
-              <a:rPr lang="en-CA"/>
-              <a:t>TKT offers a secure and transparent platform for both event attendees and organizers alike. Because TKTs are minted on the Ethereum blockchain, transactions are immutable and attendees have total ownership of TKTs in their wallet, while organizers can guarantee authenticity.</a:t>
+              <a:rPr lang="en-CA" dirty="0"/>
+              <a:t>TKT offers a secure and transparent platform for event attendees and organizers. Because TKTs are minted on the Ethereum blockchain, transactions are immutable and attendees have total ownership of TKTs in their wallet, while organizers can guarantee authenticity.</a:t>
             </a:r>
-            <a:endParaRPr/>
+            <a:endParaRPr dirty="0"/>
           </a:p>
           <a:p>
             <a:pPr marL="0" lvl="0" indent="0" algn="l" rtl="0">
@@ -8758,10 +8758,10 @@
               <a:buNone/>
             </a:pPr>
             <a:r>
-              <a:rPr lang="en-CA"/>
+              <a:rPr lang="en-CA" dirty="0"/>
               <a:t>TKT aims to decentralize and disrupt the $60+ billion global ticketing industry.</a:t>
             </a:r>
-            <a:endParaRPr/>
+            <a:endParaRPr dirty="0"/>
           </a:p>
         </p:txBody>
       </p:sp>

</xml_diff>